<commit_message>
working on aspnetcore3 deck
</commit_message>
<xml_diff>
--- a/presentations/aspnetcore3-whatsnew/aspnetcore3-whatsnew.pptx
+++ b/presentations/aspnetcore3-whatsnew/aspnetcore3-whatsnew.pptx
@@ -5,13 +5,14 @@
     <p:sldMasterId id="2147483648" r:id="rId4"/>
   </p:sldMasterIdLst>
   <p:notesMasterIdLst>
-    <p:notesMasterId r:id="rId6"/>
+    <p:notesMasterId r:id="rId7"/>
   </p:notesMasterIdLst>
   <p:handoutMasterIdLst>
-    <p:handoutMasterId r:id="rId7"/>
+    <p:handoutMasterId r:id="rId8"/>
   </p:handoutMasterIdLst>
   <p:sldIdLst>
     <p:sldId id="298" r:id="rId5"/>
+    <p:sldId id="299" r:id="rId6"/>
   </p:sldIdLst>
   <p:sldSz cx="12192000" cy="6858000"/>
   <p:notesSz cx="6858000" cy="9144000"/>
@@ -113,12 +114,10 @@
   <p:extLst>
     <p:ext uri="{521415D9-36F7-43E2-AB2F-B90AF26B5E84}">
       <p14:sectionLst xmlns:p14="http://schemas.microsoft.com/office/powerpoint/2010/main">
-        <p14:section name="Summary Section" id="{8916951F-F7D3-4DB9-9F40-792C0A710FD5}">
-          <p14:sldIdLst/>
-        </p14:section>
-        <p14:section name="Advanced  Azure  App Services" id="{76D3CC47-09D7-466F-B5E8-D22F37A41311}">
+        <p14:section name="Introduction" id="{2B4F2F16-BA58-436E-99C4-412377A0C918}">
           <p14:sldIdLst>
             <p14:sldId id="298"/>
+            <p14:sldId id="299"/>
           </p14:sldIdLst>
         </p14:section>
       </p14:sectionLst>
@@ -227,7 +226,7 @@
           <a:p>
             <a:fld id="{EF1077DB-935E-4A0A-947A-D283B9F9F452}" type="datetimeFigureOut">
               <a:rPr lang="en-US" smtClean="0"/>
-              <a:t>9/6/2019</a:t>
+              <a:t>9/13/2019</a:t>
             </a:fld>
             <a:endParaRPr lang="en-US"/>
           </a:p>
@@ -404,7 +403,7 @@
           <a:p>
             <a:fld id="{2D9EC30E-1A71-4188-9BE7-E2A64929A436}" type="datetimeFigureOut">
               <a:rPr lang="en-US" noProof="0" smtClean="0"/>
-              <a:t>9/6/2019</a:t>
+              <a:t>9/13/2019</a:t>
             </a:fld>
             <a:endParaRPr lang="en-US" noProof="0"/>
           </a:p>
@@ -19580,6 +19579,36 @@
           <a:chExt cx="0" cy="0"/>
         </a:xfrm>
       </p:grpSpPr>
+      <p:pic>
+        <p:nvPicPr>
+          <p:cNvPr id="5" name="Picture 4" descr="A close up of a sign&#10;&#10;Description automatically generated">
+            <a:extLst>
+              <a:ext uri="{FF2B5EF4-FFF2-40B4-BE49-F238E27FC236}">
+                <a16:creationId xmlns:a16="http://schemas.microsoft.com/office/drawing/2014/main" id="{71E3FD6E-072E-4DAF-96B6-BA6EA33DBE46}"/>
+              </a:ext>
+            </a:extLst>
+          </p:cNvPr>
+          <p:cNvPicPr>
+            <a:picLocks noChangeAspect="1"/>
+          </p:cNvPicPr>
+          <p:nvPr/>
+        </p:nvPicPr>
+        <p:blipFill>
+          <a:blip r:embed="rId2"/>
+          <a:stretch>
+            <a:fillRect/>
+          </a:stretch>
+        </p:blipFill>
+        <p:spPr>
+          <a:xfrm>
+            <a:off x="5239519" y="189161"/>
+            <a:ext cx="2128357" cy="2128357"/>
+          </a:xfrm>
+          <a:prstGeom prst="rect">
+            <a:avLst/>
+          </a:prstGeom>
+        </p:spPr>
+      </p:pic>
       <p:sp>
         <p:nvSpPr>
           <p:cNvPr id="3" name="Title 2">
@@ -19598,14 +19627,19 @@
         </p:nvSpPr>
         <p:spPr>
           <a:xfrm>
-            <a:off x="5735575" y="4793501"/>
-            <a:ext cx="6389625" cy="1993506"/>
+            <a:off x="1608821" y="3590575"/>
+            <a:ext cx="9383129" cy="3191643"/>
           </a:xfrm>
         </p:spPr>
         <p:txBody>
           <a:bodyPr/>
           <a:lstStyle/>
           <a:p>
+            <a:pPr>
+              <a:lnSpc>
+                <a:spcPct val="100000"/>
+              </a:lnSpc>
+            </a:pPr>
             <a:r>
               <a:rPr lang="en-US" dirty="0">
                 <a:solidFill>
@@ -19629,12 +19663,27 @@
               </a:rPr>
             </a:br>
             <a:r>
-              <a:rPr lang="en-US" dirty="0">
+              <a:rPr lang="en-US" sz="4000" dirty="0">
                 <a:solidFill>
                   <a:schemeClr val="accent6"/>
                 </a:solidFill>
               </a:rPr>
-              <a:t>What’s New?</a:t>
+              <a:t>Building Apps &amp; Services</a:t>
+            </a:r>
+            <a:br>
+              <a:rPr lang="en-US" sz="4000" dirty="0">
+                <a:solidFill>
+                  <a:schemeClr val="accent6"/>
+                </a:solidFill>
+              </a:rPr>
+            </a:br>
+            <a:r>
+              <a:rPr lang="en-US" sz="4000" dirty="0">
+                <a:solidFill>
+                  <a:schemeClr val="accent6"/>
+                </a:solidFill>
+              </a:rPr>
+              <a:t> . . . Whats New!?</a:t>
             </a:r>
           </a:p>
         </p:txBody>
@@ -19657,7 +19706,7 @@
         </p:nvSpPr>
         <p:spPr>
           <a:xfrm>
-            <a:off x="7923346" y="5834976"/>
+            <a:off x="6860536" y="5839763"/>
             <a:ext cx="4000500" cy="758933"/>
           </a:xfrm>
         </p:spPr>
@@ -19694,6 +19743,96 @@
           </a:p>
         </p:txBody>
       </p:sp>
+      <p:pic>
+        <p:nvPicPr>
+          <p:cNvPr id="7" name="Picture 6">
+            <a:extLst>
+              <a:ext uri="{FF2B5EF4-FFF2-40B4-BE49-F238E27FC236}">
+                <a16:creationId xmlns:a16="http://schemas.microsoft.com/office/drawing/2014/main" id="{71ED7D9C-B11F-4B9C-A824-F6CD09BA456A}"/>
+              </a:ext>
+            </a:extLst>
+          </p:cNvPr>
+          <p:cNvPicPr>
+            <a:picLocks noChangeAspect="1"/>
+          </p:cNvPicPr>
+          <p:nvPr/>
+        </p:nvPicPr>
+        <p:blipFill>
+          <a:blip r:embed="rId3"/>
+          <a:stretch>
+            <a:fillRect/>
+          </a:stretch>
+        </p:blipFill>
+        <p:spPr>
+          <a:xfrm>
+            <a:off x="10944133" y="352276"/>
+            <a:ext cx="853707" cy="853707"/>
+          </a:xfrm>
+          <a:prstGeom prst="rect">
+            <a:avLst/>
+          </a:prstGeom>
+        </p:spPr>
+      </p:pic>
+      <p:pic>
+        <p:nvPicPr>
+          <p:cNvPr id="9" name="Picture 8" descr="A close up of a logo&#10;&#10;Description automatically generated">
+            <a:extLst>
+              <a:ext uri="{FF2B5EF4-FFF2-40B4-BE49-F238E27FC236}">
+                <a16:creationId xmlns:a16="http://schemas.microsoft.com/office/drawing/2014/main" id="{92034088-A9D1-4D7D-93EF-BCB23C6B5ABB}"/>
+              </a:ext>
+            </a:extLst>
+          </p:cNvPr>
+          <p:cNvPicPr>
+            <a:picLocks noChangeAspect="1"/>
+          </p:cNvPicPr>
+          <p:nvPr/>
+        </p:nvPicPr>
+        <p:blipFill>
+          <a:blip r:embed="rId4"/>
+          <a:stretch>
+            <a:fillRect/>
+          </a:stretch>
+        </p:blipFill>
+        <p:spPr>
+          <a:xfrm>
+            <a:off x="10669427" y="1155766"/>
+            <a:ext cx="1403118" cy="1403118"/>
+          </a:xfrm>
+          <a:prstGeom prst="rect">
+            <a:avLst/>
+          </a:prstGeom>
+        </p:spPr>
+      </p:pic>
+      <p:pic>
+        <p:nvPicPr>
+          <p:cNvPr id="12" name="Picture 11">
+            <a:extLst>
+              <a:ext uri="{FF2B5EF4-FFF2-40B4-BE49-F238E27FC236}">
+                <a16:creationId xmlns:a16="http://schemas.microsoft.com/office/drawing/2014/main" id="{163361A9-B2CE-4CA4-A930-39F81E745E8B}"/>
+              </a:ext>
+            </a:extLst>
+          </p:cNvPr>
+          <p:cNvPicPr>
+            <a:picLocks noChangeAspect="1"/>
+          </p:cNvPicPr>
+          <p:nvPr/>
+        </p:nvPicPr>
+        <p:blipFill>
+          <a:blip r:embed="rId5"/>
+          <a:stretch>
+            <a:fillRect/>
+          </a:stretch>
+        </p:blipFill>
+        <p:spPr>
+          <a:xfrm>
+            <a:off x="7682073" y="352276"/>
+            <a:ext cx="2947863" cy="1965242"/>
+          </a:xfrm>
+          <a:prstGeom prst="rect">
+            <a:avLst/>
+          </a:prstGeom>
+        </p:spPr>
+      </p:pic>
     </p:spTree>
     <p:extLst>
       <p:ext uri="{BB962C8B-B14F-4D97-AF65-F5344CB8AC3E}">
@@ -19716,6 +19855,223 @@
       </p:transition>
     </mc:Fallback>
   </mc:AlternateContent>
+</p:sld>
+</file>
+
+<file path=ppt/slides/slide2.xml><?xml version="1.0" encoding="utf-8"?>
+<p:sld xmlns:a="http://schemas.openxmlformats.org/drawingml/2006/main" xmlns:r="http://schemas.openxmlformats.org/officeDocument/2006/relationships" xmlns:p="http://schemas.openxmlformats.org/presentationml/2006/main">
+  <p:cSld>
+    <p:spTree>
+      <p:nvGrpSpPr>
+        <p:cNvPr id="1" name=""/>
+        <p:cNvGrpSpPr/>
+        <p:nvPr/>
+      </p:nvGrpSpPr>
+      <p:grpSpPr>
+        <a:xfrm>
+          <a:off x="0" y="0"/>
+          <a:ext cx="0" cy="0"/>
+          <a:chOff x="0" y="0"/>
+          <a:chExt cx="0" cy="0"/>
+        </a:xfrm>
+      </p:grpSpPr>
+      <p:sp>
+        <p:nvSpPr>
+          <p:cNvPr id="2" name="Title 1">
+            <a:extLst>
+              <a:ext uri="{FF2B5EF4-FFF2-40B4-BE49-F238E27FC236}">
+                <a16:creationId xmlns:a16="http://schemas.microsoft.com/office/drawing/2014/main" id="{DFC9D017-DF12-4AE6-91DC-FBC83885B92B}"/>
+              </a:ext>
+            </a:extLst>
+          </p:cNvPr>
+          <p:cNvSpPr>
+            <a:spLocks noGrp="1"/>
+          </p:cNvSpPr>
+          <p:nvPr>
+            <p:ph type="title"/>
+          </p:nvPr>
+        </p:nvSpPr>
+        <p:spPr/>
+        <p:txBody>
+          <a:bodyPr/>
+          <a:lstStyle/>
+          <a:p>
+            <a:r>
+              <a:rPr lang="en-US" dirty="0"/>
+              <a:t>Agenda</a:t>
+            </a:r>
+          </a:p>
+        </p:txBody>
+      </p:sp>
+      <p:sp>
+        <p:nvSpPr>
+          <p:cNvPr id="3" name="Text Placeholder 2">
+            <a:extLst>
+              <a:ext uri="{FF2B5EF4-FFF2-40B4-BE49-F238E27FC236}">
+                <a16:creationId xmlns:a16="http://schemas.microsoft.com/office/drawing/2014/main" id="{A148DC94-D3E9-4D73-94BA-7F1D5BDEFCE5}"/>
+              </a:ext>
+            </a:extLst>
+          </p:cNvPr>
+          <p:cNvSpPr>
+            <a:spLocks noGrp="1"/>
+          </p:cNvSpPr>
+          <p:nvPr>
+            <p:ph type="body" sz="quarter" idx="32"/>
+          </p:nvPr>
+        </p:nvSpPr>
+        <p:spPr/>
+        <p:txBody>
+          <a:bodyPr/>
+          <a:lstStyle/>
+          <a:p>
+            <a:endParaRPr lang="en-US" dirty="0"/>
+          </a:p>
+        </p:txBody>
+      </p:sp>
+      <p:sp>
+        <p:nvSpPr>
+          <p:cNvPr id="5" name="Slide Number Placeholder 4">
+            <a:extLst>
+              <a:ext uri="{FF2B5EF4-FFF2-40B4-BE49-F238E27FC236}">
+                <a16:creationId xmlns:a16="http://schemas.microsoft.com/office/drawing/2014/main" id="{91874900-2BB1-4696-8E74-372784047B61}"/>
+              </a:ext>
+            </a:extLst>
+          </p:cNvPr>
+          <p:cNvSpPr>
+            <a:spLocks noGrp="1"/>
+          </p:cNvSpPr>
+          <p:nvPr>
+            <p:ph type="sldNum" sz="quarter" idx="15"/>
+          </p:nvPr>
+        </p:nvSpPr>
+        <p:spPr/>
+        <p:txBody>
+          <a:bodyPr/>
+          <a:lstStyle/>
+          <a:p>
+            <a:fld id="{19B51A1E-902D-48AF-9020-955120F399B6}" type="slidenum">
+              <a:rPr lang="en-US" noProof="0" smtClean="0"/>
+              <a:pPr/>
+              <a:t>2</a:t>
+            </a:fld>
+            <a:endParaRPr lang="en-US" noProof="0" dirty="0"/>
+          </a:p>
+        </p:txBody>
+      </p:sp>
+      <p:pic>
+        <p:nvPicPr>
+          <p:cNvPr id="13" name="Content Placeholder 10">
+            <a:extLst>
+              <a:ext uri="{FF2B5EF4-FFF2-40B4-BE49-F238E27FC236}">
+                <a16:creationId xmlns:a16="http://schemas.microsoft.com/office/drawing/2014/main" id="{89C8C398-40F5-47A8-B3CB-0D1713764CB5}"/>
+              </a:ext>
+            </a:extLst>
+          </p:cNvPr>
+          <p:cNvPicPr>
+            <a:picLocks noGrp="1" noChangeAspect="1"/>
+          </p:cNvPicPr>
+          <p:nvPr>
+            <p:ph idx="34"/>
+          </p:nvPr>
+        </p:nvPicPr>
+        <p:blipFill>
+          <a:blip r:embed="rId2"/>
+          <a:stretch>
+            <a:fillRect/>
+          </a:stretch>
+        </p:blipFill>
+        <p:spPr>
+          <a:xfrm>
+            <a:off x="8172450" y="2652209"/>
+            <a:ext cx="3598863" cy="2398131"/>
+          </a:xfrm>
+          <a:prstGeom prst="rect">
+            <a:avLst/>
+          </a:prstGeom>
+        </p:spPr>
+      </p:pic>
+      <p:pic>
+        <p:nvPicPr>
+          <p:cNvPr id="15" name="Content Placeholder 9" descr="A close up of a logo&#10;&#10;Description automatically generated">
+            <a:extLst>
+              <a:ext uri="{FF2B5EF4-FFF2-40B4-BE49-F238E27FC236}">
+                <a16:creationId xmlns:a16="http://schemas.microsoft.com/office/drawing/2014/main" id="{8EBFA666-E162-451C-B1AB-A756B70AFB18}"/>
+              </a:ext>
+            </a:extLst>
+          </p:cNvPr>
+          <p:cNvPicPr>
+            <a:picLocks noGrp="1" noChangeAspect="1"/>
+          </p:cNvPicPr>
+          <p:nvPr>
+            <p:ph idx="33"/>
+          </p:nvPr>
+        </p:nvPicPr>
+        <p:blipFill>
+          <a:blip r:embed="rId3">
+            <a:duotone>
+              <a:prstClr val="black"/>
+              <a:schemeClr val="accent4">
+                <a:tint val="45000"/>
+                <a:satMod val="400000"/>
+              </a:schemeClr>
+            </a:duotone>
+          </a:blip>
+          <a:stretch>
+            <a:fillRect/>
+          </a:stretch>
+        </p:blipFill>
+        <p:spPr>
+          <a:xfrm>
+            <a:off x="4302125" y="2051050"/>
+            <a:ext cx="3600450" cy="3600450"/>
+          </a:xfrm>
+          <a:prstGeom prst="rect">
+            <a:avLst/>
+          </a:prstGeom>
+        </p:spPr>
+      </p:pic>
+      <p:pic>
+        <p:nvPicPr>
+          <p:cNvPr id="17" name="Content Placeholder 7" descr="A close up of a sign&#10;&#10;Description automatically generated">
+            <a:extLst>
+              <a:ext uri="{FF2B5EF4-FFF2-40B4-BE49-F238E27FC236}">
+                <a16:creationId xmlns:a16="http://schemas.microsoft.com/office/drawing/2014/main" id="{8DC43BBD-7FA7-4429-8056-1ABBC9FF0F9B}"/>
+              </a:ext>
+            </a:extLst>
+          </p:cNvPr>
+          <p:cNvPicPr>
+            <a:picLocks noGrp="1" noChangeAspect="1"/>
+          </p:cNvPicPr>
+          <p:nvPr>
+            <p:ph idx="1"/>
+          </p:nvPr>
+        </p:nvPicPr>
+        <p:blipFill>
+          <a:blip r:embed="rId4"/>
+          <a:stretch>
+            <a:fillRect/>
+          </a:stretch>
+        </p:blipFill>
+        <p:spPr>
+          <a:xfrm>
+            <a:off x="431800" y="2051050"/>
+            <a:ext cx="3600450" cy="3600450"/>
+          </a:xfrm>
+          <a:prstGeom prst="rect">
+            <a:avLst/>
+          </a:prstGeom>
+        </p:spPr>
+      </p:pic>
+    </p:spTree>
+    <p:extLst>
+      <p:ext uri="{BB962C8B-B14F-4D97-AF65-F5344CB8AC3E}">
+        <p14:creationId xmlns:p14="http://schemas.microsoft.com/office/powerpoint/2010/main" val="1569185726"/>
+      </p:ext>
+    </p:extLst>
+  </p:cSld>
+  <p:clrMapOvr>
+    <a:masterClrMapping/>
+  </p:clrMapOvr>
 </p:sld>
 </file>
 
@@ -20541,6 +20897,23 @@
 </file>
 
 <file path=customXml/item1.xml><?xml version="1.0" encoding="utf-8"?>
+<p:properties xmlns:p="http://schemas.microsoft.com/office/2006/metadata/properties" xmlns:xsi="http://www.w3.org/2001/XMLSchema-instance" xmlns:pc="http://schemas.microsoft.com/office/infopath/2007/PartnerControls">
+  <documentManagement>
+    <MediaServiceKeyPoints xmlns="71af3243-3dd4-4a8d-8c0d-dd76da1f02a5" xsi:nil="true"/>
+  </documentManagement>
+</p:properties>
+</file>
+
+<file path=customXml/item2.xml><?xml version="1.0" encoding="utf-8"?>
+<?mso-contentType ?>
+<FormTemplates xmlns="http://schemas.microsoft.com/sharepoint/v3/contenttype/forms">
+  <Display>DocumentLibraryForm</Display>
+  <Edit>DocumentLibraryForm</Edit>
+  <New>DocumentLibraryForm</New>
+</FormTemplates>
+</file>
+
+<file path=customXml/item3.xml><?xml version="1.0" encoding="utf-8"?>
 <ct:contentTypeSchema xmlns:ct="http://schemas.microsoft.com/office/2006/metadata/contentType" xmlns:ma="http://schemas.microsoft.com/office/2006/metadata/properties/metaAttributes" ct:_="" ma:_="" ma:contentTypeName="Document" ma:contentTypeID="0x01010079F111ED35F8CC479449609E8A0923A6" ma:contentTypeVersion="11" ma:contentTypeDescription="Create a new document." ma:contentTypeScope="" ma:versionID="96291512c1ee715ab617f4c07df79fc1">
   <xsd:schema xmlns:xsd="http://www.w3.org/2001/XMLSchema" xmlns:xs="http://www.w3.org/2001/XMLSchema" xmlns:p="http://schemas.microsoft.com/office/2006/metadata/properties" xmlns:ns2="71af3243-3dd4-4a8d-8c0d-dd76da1f02a5" xmlns:ns3="16c05727-aa75-4e4a-9b5f-8a80a1165891" targetNamespace="http://schemas.microsoft.com/office/2006/metadata/properties" ma:root="true" ma:fieldsID="8256c27c40ca5c40ce1cf6c44f0205df" ns2:_="" ns3:_="">
     <xsd:import namespace="71af3243-3dd4-4a8d-8c0d-dd76da1f02a5"/>
@@ -20751,24 +21124,32 @@
 </ct:contentTypeSchema>
 </file>
 
-<file path=customXml/item2.xml><?xml version="1.0" encoding="utf-8"?>
-<?mso-contentType ?>
-<FormTemplates xmlns="http://schemas.microsoft.com/sharepoint/v3/contenttype/forms">
-  <Display>DocumentLibraryForm</Display>
-  <Edit>DocumentLibraryForm</Edit>
-  <New>DocumentLibraryForm</New>
-</FormTemplates>
+<file path=customXml/itemProps1.xml><?xml version="1.0" encoding="utf-8"?>
+<ds:datastoreItem xmlns:ds="http://schemas.openxmlformats.org/officeDocument/2006/customXml" ds:itemID="{A861FE8A-8F15-409F-AF62-619C69C0D537}">
+  <ds:schemaRefs>
+    <ds:schemaRef ds:uri="http://schemas.openxmlformats.org/package/2006/metadata/core-properties"/>
+    <ds:schemaRef ds:uri="http://purl.org/dc/terms/"/>
+    <ds:schemaRef ds:uri="http://schemas.microsoft.com/office/infopath/2007/PartnerControls"/>
+    <ds:schemaRef ds:uri="http://schemas.microsoft.com/office/2006/documentManagement/types"/>
+    <ds:schemaRef ds:uri="http://schemas.microsoft.com/office/2006/metadata/properties"/>
+    <ds:schemaRef ds:uri="http://purl.org/dc/elements/1.1/"/>
+    <ds:schemaRef ds:uri="16c05727-aa75-4e4a-9b5f-8a80a1165891"/>
+    <ds:schemaRef ds:uri="71af3243-3dd4-4a8d-8c0d-dd76da1f02a5"/>
+    <ds:schemaRef ds:uri="http://www.w3.org/XML/1998/namespace"/>
+    <ds:schemaRef ds:uri="http://purl.org/dc/dcmitype/"/>
+  </ds:schemaRefs>
+</ds:datastoreItem>
 </file>
 
-<file path=customXml/item3.xml><?xml version="1.0" encoding="utf-8"?>
-<p:properties xmlns:p="http://schemas.microsoft.com/office/2006/metadata/properties" xmlns:xsi="http://www.w3.org/2001/XMLSchema-instance" xmlns:pc="http://schemas.microsoft.com/office/infopath/2007/PartnerControls">
-  <documentManagement>
-    <MediaServiceKeyPoints xmlns="71af3243-3dd4-4a8d-8c0d-dd76da1f02a5" xsi:nil="true"/>
-  </documentManagement>
-</p:properties>
+<file path=customXml/itemProps2.xml><?xml version="1.0" encoding="utf-8"?>
+<ds:datastoreItem xmlns:ds="http://schemas.openxmlformats.org/officeDocument/2006/customXml" ds:itemID="{8A930687-51F2-44C8-9CE6-D1B3D6E17522}">
+  <ds:schemaRefs>
+    <ds:schemaRef ds:uri="http://schemas.microsoft.com/sharepoint/v3/contenttype/forms"/>
+  </ds:schemaRefs>
+</ds:datastoreItem>
 </file>
 
-<file path=customXml/itemProps1.xml><?xml version="1.0" encoding="utf-8"?>
+<file path=customXml/itemProps3.xml><?xml version="1.0" encoding="utf-8"?>
 <ds:datastoreItem xmlns:ds="http://schemas.openxmlformats.org/officeDocument/2006/customXml" ds:itemID="{29AE7CBC-C35C-4FA9-B339-59E31F30C6AC}">
   <ds:schemaRefs>
     <ds:schemaRef ds:uri="http://schemas.microsoft.com/office/2006/metadata/contentType"/>
@@ -20785,29 +21166,4 @@
     <ds:schemaRef ds:uri="http://schemas.microsoft.com/internal/obd"/>
   </ds:schemaRefs>
 </ds:datastoreItem>
-</file>
-
-<file path=customXml/itemProps2.xml><?xml version="1.0" encoding="utf-8"?>
-<ds:datastoreItem xmlns:ds="http://schemas.openxmlformats.org/officeDocument/2006/customXml" ds:itemID="{8A930687-51F2-44C8-9CE6-D1B3D6E17522}">
-  <ds:schemaRefs>
-    <ds:schemaRef ds:uri="http://schemas.microsoft.com/sharepoint/v3/contenttype/forms"/>
-  </ds:schemaRefs>
-</ds:datastoreItem>
-</file>
-
-<file path=customXml/itemProps3.xml><?xml version="1.0" encoding="utf-8"?>
-<ds:datastoreItem xmlns:ds="http://schemas.openxmlformats.org/officeDocument/2006/customXml" ds:itemID="{A861FE8A-8F15-409F-AF62-619C69C0D537}">
-  <ds:schemaRefs>
-    <ds:schemaRef ds:uri="http://schemas.openxmlformats.org/package/2006/metadata/core-properties"/>
-    <ds:schemaRef ds:uri="http://purl.org/dc/terms/"/>
-    <ds:schemaRef ds:uri="http://schemas.microsoft.com/office/infopath/2007/PartnerControls"/>
-    <ds:schemaRef ds:uri="http://schemas.microsoft.com/office/2006/documentManagement/types"/>
-    <ds:schemaRef ds:uri="http://schemas.microsoft.com/office/2006/metadata/properties"/>
-    <ds:schemaRef ds:uri="http://purl.org/dc/elements/1.1/"/>
-    <ds:schemaRef ds:uri="16c05727-aa75-4e4a-9b5f-8a80a1165891"/>
-    <ds:schemaRef ds:uri="71af3243-3dd4-4a8d-8c0d-dd76da1f02a5"/>
-    <ds:schemaRef ds:uri="http://www.w3.org/XML/1998/namespace"/>
-    <ds:schemaRef ds:uri="http://purl.org/dc/dcmitype/"/>
-  </ds:schemaRefs>
-</ds:datastoreItem>
 </file>
</xml_diff>

<commit_message>
updating for aspnetcore3 new
</commit_message>
<xml_diff>
--- a/presentations/aspnetcore3-whatsnew/aspnetcore3-whatsnew.pptx
+++ b/presentations/aspnetcore3-whatsnew/aspnetcore3-whatsnew.pptx
@@ -276,7 +276,7 @@
           <a:p>
             <a:fld id="{EF1077DB-935E-4A0A-947A-D283B9F9F452}" type="datetimeFigureOut">
               <a:rPr lang="en-US" smtClean="0"/>
-              <a:t>9/24/2019</a:t>
+              <a:t>10/1/2019</a:t>
             </a:fld>
             <a:endParaRPr lang="en-US"/>
           </a:p>
@@ -453,7 +453,7 @@
           <a:p>
             <a:fld id="{2D9EC30E-1A71-4188-9BE7-E2A64929A436}" type="datetimeFigureOut">
               <a:rPr lang="en-US" noProof="0" smtClean="0"/>
-              <a:t>9/24/2019</a:t>
+              <a:t>9/30/2019</a:t>
             </a:fld>
             <a:endParaRPr lang="en-US" noProof="0"/>
           </a:p>
@@ -25817,6 +25817,15 @@
 </file>
 
 <file path=customXml/item1.xml><?xml version="1.0" encoding="utf-8"?>
+<?mso-contentType ?>
+<FormTemplates xmlns="http://schemas.microsoft.com/sharepoint/v3/contenttype/forms">
+  <Display>DocumentLibraryForm</Display>
+  <Edit>DocumentLibraryForm</Edit>
+  <New>DocumentLibraryForm</New>
+</FormTemplates>
+</file>
+
+<file path=customXml/item2.xml><?xml version="1.0" encoding="utf-8"?>
 <ct:contentTypeSchema xmlns:ct="http://schemas.microsoft.com/office/2006/metadata/contentType" xmlns:ma="http://schemas.microsoft.com/office/2006/metadata/properties/metaAttributes" ct:_="" ma:_="" ma:contentTypeName="Document" ma:contentTypeID="0x01010079F111ED35F8CC479449609E8A0923A6" ma:contentTypeVersion="11" ma:contentTypeDescription="Create a new document." ma:contentTypeScope="" ma:versionID="96291512c1ee715ab617f4c07df79fc1">
   <xsd:schema xmlns:xsd="http://www.w3.org/2001/XMLSchema" xmlns:xs="http://www.w3.org/2001/XMLSchema" xmlns:p="http://schemas.microsoft.com/office/2006/metadata/properties" xmlns:ns2="71af3243-3dd4-4a8d-8c0d-dd76da1f02a5" xmlns:ns3="16c05727-aa75-4e4a-9b5f-8a80a1165891" targetNamespace="http://schemas.microsoft.com/office/2006/metadata/properties" ma:root="true" ma:fieldsID="8256c27c40ca5c40ce1cf6c44f0205df" ns2:_="" ns3:_="">
     <xsd:import namespace="71af3243-3dd4-4a8d-8c0d-dd76da1f02a5"/>
@@ -26027,15 +26036,6 @@
 </ct:contentTypeSchema>
 </file>
 
-<file path=customXml/item2.xml><?xml version="1.0" encoding="utf-8"?>
-<?mso-contentType ?>
-<FormTemplates xmlns="http://schemas.microsoft.com/sharepoint/v3/contenttype/forms">
-  <Display>DocumentLibraryForm</Display>
-  <Edit>DocumentLibraryForm</Edit>
-  <New>DocumentLibraryForm</New>
-</FormTemplates>
-</file>
-
 <file path=customXml/item3.xml><?xml version="1.0" encoding="utf-8"?>
 <p:properties xmlns:p="http://schemas.microsoft.com/office/2006/metadata/properties" xmlns:xsi="http://www.w3.org/2001/XMLSchema-instance" xmlns:pc="http://schemas.microsoft.com/office/infopath/2007/PartnerControls">
   <documentManagement>
@@ -26045,6 +26045,14 @@
 </file>
 
 <file path=customXml/itemProps1.xml><?xml version="1.0" encoding="utf-8"?>
+<ds:datastoreItem xmlns:ds="http://schemas.openxmlformats.org/officeDocument/2006/customXml" ds:itemID="{8A930687-51F2-44C8-9CE6-D1B3D6E17522}">
+  <ds:schemaRefs>
+    <ds:schemaRef ds:uri="http://schemas.microsoft.com/sharepoint/v3/contenttype/forms"/>
+  </ds:schemaRefs>
+</ds:datastoreItem>
+</file>
+
+<file path=customXml/itemProps2.xml><?xml version="1.0" encoding="utf-8"?>
 <ds:datastoreItem xmlns:ds="http://schemas.openxmlformats.org/officeDocument/2006/customXml" ds:itemID="{29AE7CBC-C35C-4FA9-B339-59E31F30C6AC}">
   <ds:schemaRefs>
     <ds:schemaRef ds:uri="http://schemas.microsoft.com/office/2006/metadata/contentType"/>
@@ -26063,27 +26071,19 @@
 </ds:datastoreItem>
 </file>
 
-<file path=customXml/itemProps2.xml><?xml version="1.0" encoding="utf-8"?>
-<ds:datastoreItem xmlns:ds="http://schemas.openxmlformats.org/officeDocument/2006/customXml" ds:itemID="{8A930687-51F2-44C8-9CE6-D1B3D6E17522}">
-  <ds:schemaRefs>
-    <ds:schemaRef ds:uri="http://schemas.microsoft.com/sharepoint/v3/contenttype/forms"/>
-  </ds:schemaRefs>
-</ds:datastoreItem>
-</file>
-
 <file path=customXml/itemProps3.xml><?xml version="1.0" encoding="utf-8"?>
 <ds:datastoreItem xmlns:ds="http://schemas.openxmlformats.org/officeDocument/2006/customXml" ds:itemID="{A861FE8A-8F15-409F-AF62-619C69C0D537}">
   <ds:schemaRefs>
+    <ds:schemaRef ds:uri="http://www.w3.org/XML/1998/namespace"/>
     <ds:schemaRef ds:uri="http://schemas.microsoft.com/office/2006/metadata/properties"/>
+    <ds:schemaRef ds:uri="http://schemas.microsoft.com/office/infopath/2007/PartnerControls"/>
+    <ds:schemaRef ds:uri="http://schemas.microsoft.com/office/2006/documentManagement/types"/>
+    <ds:schemaRef ds:uri="http://schemas.openxmlformats.org/package/2006/metadata/core-properties"/>
     <ds:schemaRef ds:uri="16c05727-aa75-4e4a-9b5f-8a80a1165891"/>
-    <ds:schemaRef ds:uri="http://schemas.microsoft.com/office/2006/documentManagement/types"/>
+    <ds:schemaRef ds:uri="http://purl.org/dc/dcmitype/"/>
+    <ds:schemaRef ds:uri="71af3243-3dd4-4a8d-8c0d-dd76da1f02a5"/>
+    <ds:schemaRef ds:uri="http://purl.org/dc/terms/"/>
     <ds:schemaRef ds:uri="http://purl.org/dc/elements/1.1/"/>
-    <ds:schemaRef ds:uri="http://www.w3.org/XML/1998/namespace"/>
-    <ds:schemaRef ds:uri="http://schemas.microsoft.com/office/infopath/2007/PartnerControls"/>
-    <ds:schemaRef ds:uri="http://schemas.openxmlformats.org/package/2006/metadata/core-properties"/>
-    <ds:schemaRef ds:uri="71af3243-3dd4-4a8d-8c0d-dd76da1f02a5"/>
-    <ds:schemaRef ds:uri="http://purl.org/dc/dcmitype/"/>
-    <ds:schemaRef ds:uri="http://purl.org/dc/terms/"/>
   </ds:schemaRefs>
 </ds:datastoreItem>
 </file>
</xml_diff>